<commit_message>
initial commit of viva presentation
</commit_message>
<xml_diff>
--- a/images/quadcopter-domain-figure.pptx
+++ b/images/quadcopter-domain-figure.pptx
@@ -19,6 +19,10 @@
     <p:sldId id="273" r:id="rId13"/>
     <p:sldId id="261" r:id="rId14"/>
     <p:sldId id="262" r:id="rId15"/>
+    <p:sldId id="274" r:id="rId16"/>
+    <p:sldId id="277" r:id="rId17"/>
+    <p:sldId id="275" r:id="rId18"/>
+    <p:sldId id="276" r:id="rId19"/>
   </p:sldIdLst>
   <p:sldSz cx="12192000" cy="6858000"/>
   <p:notesSz cx="6858000" cy="9144000"/>
@@ -274,7 +278,7 @@
           <a:p>
             <a:fld id="{9F247783-9C3D-9248-A05D-BFB1892E24E9}" type="datetimeFigureOut">
               <a:rPr lang="en-US" smtClean="0"/>
-              <a:t>4/26/22</a:t>
+              <a:t>6/22/22</a:t>
             </a:fld>
             <a:endParaRPr lang="en-US"/>
           </a:p>
@@ -474,7 +478,7 @@
           <a:p>
             <a:fld id="{9F247783-9C3D-9248-A05D-BFB1892E24E9}" type="datetimeFigureOut">
               <a:rPr lang="en-US" smtClean="0"/>
-              <a:t>4/26/22</a:t>
+              <a:t>6/22/22</a:t>
             </a:fld>
             <a:endParaRPr lang="en-US"/>
           </a:p>
@@ -684,7 +688,7 @@
           <a:p>
             <a:fld id="{9F247783-9C3D-9248-A05D-BFB1892E24E9}" type="datetimeFigureOut">
               <a:rPr lang="en-US" smtClean="0"/>
-              <a:t>4/26/22</a:t>
+              <a:t>6/22/22</a:t>
             </a:fld>
             <a:endParaRPr lang="en-US"/>
           </a:p>
@@ -884,7 +888,7 @@
           <a:p>
             <a:fld id="{9F247783-9C3D-9248-A05D-BFB1892E24E9}" type="datetimeFigureOut">
               <a:rPr lang="en-US" smtClean="0"/>
-              <a:t>4/26/22</a:t>
+              <a:t>6/22/22</a:t>
             </a:fld>
             <a:endParaRPr lang="en-US"/>
           </a:p>
@@ -1160,7 +1164,7 @@
           <a:p>
             <a:fld id="{9F247783-9C3D-9248-A05D-BFB1892E24E9}" type="datetimeFigureOut">
               <a:rPr lang="en-US" smtClean="0"/>
-              <a:t>4/26/22</a:t>
+              <a:t>6/22/22</a:t>
             </a:fld>
             <a:endParaRPr lang="en-US"/>
           </a:p>
@@ -1428,7 +1432,7 @@
           <a:p>
             <a:fld id="{9F247783-9C3D-9248-A05D-BFB1892E24E9}" type="datetimeFigureOut">
               <a:rPr lang="en-US" smtClean="0"/>
-              <a:t>4/26/22</a:t>
+              <a:t>6/22/22</a:t>
             </a:fld>
             <a:endParaRPr lang="en-US"/>
           </a:p>
@@ -1843,7 +1847,7 @@
           <a:p>
             <a:fld id="{9F247783-9C3D-9248-A05D-BFB1892E24E9}" type="datetimeFigureOut">
               <a:rPr lang="en-US" smtClean="0"/>
-              <a:t>4/26/22</a:t>
+              <a:t>6/22/22</a:t>
             </a:fld>
             <a:endParaRPr lang="en-US"/>
           </a:p>
@@ -1985,7 +1989,7 @@
           <a:p>
             <a:fld id="{9F247783-9C3D-9248-A05D-BFB1892E24E9}" type="datetimeFigureOut">
               <a:rPr lang="en-US" smtClean="0"/>
-              <a:t>4/26/22</a:t>
+              <a:t>6/22/22</a:t>
             </a:fld>
             <a:endParaRPr lang="en-US"/>
           </a:p>
@@ -2098,7 +2102,7 @@
           <a:p>
             <a:fld id="{9F247783-9C3D-9248-A05D-BFB1892E24E9}" type="datetimeFigureOut">
               <a:rPr lang="en-US" smtClean="0"/>
-              <a:t>4/26/22</a:t>
+              <a:t>6/22/22</a:t>
             </a:fld>
             <a:endParaRPr lang="en-US"/>
           </a:p>
@@ -2411,7 +2415,7 @@
           <a:p>
             <a:fld id="{9F247783-9C3D-9248-A05D-BFB1892E24E9}" type="datetimeFigureOut">
               <a:rPr lang="en-US" smtClean="0"/>
-              <a:t>4/26/22</a:t>
+              <a:t>6/22/22</a:t>
             </a:fld>
             <a:endParaRPr lang="en-US"/>
           </a:p>
@@ -2700,7 +2704,7 @@
           <a:p>
             <a:fld id="{9F247783-9C3D-9248-A05D-BFB1892E24E9}" type="datetimeFigureOut">
               <a:rPr lang="en-US" smtClean="0"/>
-              <a:t>4/26/22</a:t>
+              <a:t>6/22/22</a:t>
             </a:fld>
             <a:endParaRPr lang="en-US"/>
           </a:p>
@@ -2943,7 +2947,7 @@
           <a:p>
             <a:fld id="{9F247783-9C3D-9248-A05D-BFB1892E24E9}" type="datetimeFigureOut">
               <a:rPr lang="en-US" smtClean="0"/>
-              <a:t>4/26/22</a:t>
+              <a:t>6/22/22</a:t>
             </a:fld>
             <a:endParaRPr lang="en-US"/>
           </a:p>
@@ -6161,6 +6165,2081 @@
 </p:sld>
 </file>
 
+<file path=ppt/slides/slide15.xml><?xml version="1.0" encoding="utf-8"?>
+<p:sld xmlns:a="http://schemas.openxmlformats.org/drawingml/2006/main" xmlns:r="http://schemas.openxmlformats.org/officeDocument/2006/relationships" xmlns:p="http://schemas.openxmlformats.org/presentationml/2006/main">
+  <p:cSld>
+    <p:spTree>
+      <p:nvGrpSpPr>
+        <p:cNvPr id="1" name=""/>
+        <p:cNvGrpSpPr/>
+        <p:nvPr/>
+      </p:nvGrpSpPr>
+      <p:grpSpPr>
+        <a:xfrm>
+          <a:off x="0" y="0"/>
+          <a:ext cx="0" cy="0"/>
+          <a:chOff x="0" y="0"/>
+          <a:chExt cx="0" cy="0"/>
+        </a:xfrm>
+      </p:grpSpPr>
+      <p:sp>
+        <p:nvSpPr>
+          <p:cNvPr id="2" name="Rectangle 1">
+            <a:extLst>
+              <a:ext uri="{FF2B5EF4-FFF2-40B4-BE49-F238E27FC236}">
+                <a16:creationId xmlns:a16="http://schemas.microsoft.com/office/drawing/2014/main" id="{5CF3775B-C1FD-F147-9996-7528BDA0F34E}"/>
+              </a:ext>
+            </a:extLst>
+          </p:cNvPr>
+          <p:cNvSpPr/>
+          <p:nvPr/>
+        </p:nvSpPr>
+        <p:spPr>
+          <a:xfrm>
+            <a:off x="2705100" y="1213338"/>
+            <a:ext cx="6781800" cy="4369777"/>
+          </a:xfrm>
+          <a:prstGeom prst="rect">
+            <a:avLst/>
+          </a:prstGeom>
+          <a:solidFill>
+            <a:schemeClr val="tx2">
+              <a:lumMod val="40000"/>
+              <a:lumOff val="60000"/>
+            </a:schemeClr>
+          </a:solidFill>
+          <a:ln>
+            <a:noFill/>
+          </a:ln>
+        </p:spPr>
+        <p:style>
+          <a:lnRef idx="2">
+            <a:schemeClr val="accent1">
+              <a:shade val="50000"/>
+            </a:schemeClr>
+          </a:lnRef>
+          <a:fillRef idx="1">
+            <a:schemeClr val="accent1"/>
+          </a:fillRef>
+          <a:effectRef idx="0">
+            <a:schemeClr val="accent1"/>
+          </a:effectRef>
+          <a:fontRef idx="minor">
+            <a:schemeClr val="lt1"/>
+          </a:fontRef>
+        </p:style>
+        <p:txBody>
+          <a:bodyPr rtlCol="0" anchor="ctr"/>
+          <a:lstStyle/>
+          <a:p>
+            <a:pPr algn="ctr"/>
+            <a:endParaRPr lang="en-US" dirty="0">
+              <a:latin typeface="Times" pitchFamily="2" charset="0"/>
+            </a:endParaRPr>
+          </a:p>
+        </p:txBody>
+      </p:sp>
+      <p:sp>
+        <p:nvSpPr>
+          <p:cNvPr id="3" name="Rectangle 2">
+            <a:extLst>
+              <a:ext uri="{FF2B5EF4-FFF2-40B4-BE49-F238E27FC236}">
+                <a16:creationId xmlns:a16="http://schemas.microsoft.com/office/drawing/2014/main" id="{70F637E1-41AA-0A44-A1AF-B9603B1AF2C5}"/>
+              </a:ext>
+            </a:extLst>
+          </p:cNvPr>
+          <p:cNvSpPr/>
+          <p:nvPr/>
+        </p:nvSpPr>
+        <p:spPr>
+          <a:xfrm rot="5400000">
+            <a:off x="6597161" y="1209345"/>
+            <a:ext cx="1515208" cy="4264269"/>
+          </a:xfrm>
+          <a:prstGeom prst="rect">
+            <a:avLst/>
+          </a:prstGeom>
+          <a:solidFill>
+            <a:schemeClr val="accent6">
+              <a:lumMod val="40000"/>
+              <a:lumOff val="60000"/>
+            </a:schemeClr>
+          </a:solidFill>
+          <a:ln>
+            <a:noFill/>
+          </a:ln>
+        </p:spPr>
+        <p:style>
+          <a:lnRef idx="2">
+            <a:schemeClr val="accent1">
+              <a:shade val="50000"/>
+            </a:schemeClr>
+          </a:lnRef>
+          <a:fillRef idx="1">
+            <a:schemeClr val="accent1"/>
+          </a:fillRef>
+          <a:effectRef idx="0">
+            <a:schemeClr val="accent1"/>
+          </a:effectRef>
+          <a:fontRef idx="minor">
+            <a:schemeClr val="lt1"/>
+          </a:fontRef>
+        </p:style>
+        <p:txBody>
+          <a:bodyPr rtlCol="0" anchor="ctr"/>
+          <a:lstStyle/>
+          <a:p>
+            <a:pPr algn="ctr"/>
+            <a:endParaRPr lang="en-US"/>
+          </a:p>
+        </p:txBody>
+      </p:sp>
+      <p:sp>
+        <p:nvSpPr>
+          <p:cNvPr id="6" name="TextBox 5">
+            <a:extLst>
+              <a:ext uri="{FF2B5EF4-FFF2-40B4-BE49-F238E27FC236}">
+                <a16:creationId xmlns:a16="http://schemas.microsoft.com/office/drawing/2014/main" id="{E9582660-A23C-BF4A-ABB6-4F9600478D81}"/>
+              </a:ext>
+            </a:extLst>
+          </p:cNvPr>
+          <p:cNvSpPr txBox="1"/>
+          <p:nvPr/>
+        </p:nvSpPr>
+        <p:spPr>
+          <a:xfrm>
+            <a:off x="7266661" y="3729752"/>
+            <a:ext cx="1112226" cy="369332"/>
+          </a:xfrm>
+          <a:prstGeom prst="rect">
+            <a:avLst/>
+          </a:prstGeom>
+          <a:noFill/>
+        </p:spPr>
+        <p:txBody>
+          <a:bodyPr wrap="square" rtlCol="0">
+            <a:spAutoFit/>
+          </a:bodyPr>
+          <a:lstStyle/>
+          <a:p>
+            <a:r>
+              <a:rPr lang="en-US" dirty="0">
+                <a:latin typeface="Times" pitchFamily="2" charset="0"/>
+              </a:rPr>
+              <a:t>Mode 2</a:t>
+            </a:r>
+          </a:p>
+        </p:txBody>
+      </p:sp>
+      <p:sp>
+        <p:nvSpPr>
+          <p:cNvPr id="7" name="TextBox 6">
+            <a:extLst>
+              <a:ext uri="{FF2B5EF4-FFF2-40B4-BE49-F238E27FC236}">
+                <a16:creationId xmlns:a16="http://schemas.microsoft.com/office/drawing/2014/main" id="{9812938F-9D59-FD44-80ED-6DEC72242200}"/>
+              </a:ext>
+            </a:extLst>
+          </p:cNvPr>
+          <p:cNvSpPr txBox="1"/>
+          <p:nvPr/>
+        </p:nvSpPr>
+        <p:spPr>
+          <a:xfrm>
+            <a:off x="8550095" y="5233397"/>
+            <a:ext cx="1112226" cy="369332"/>
+          </a:xfrm>
+          <a:prstGeom prst="rect">
+            <a:avLst/>
+          </a:prstGeom>
+          <a:noFill/>
+        </p:spPr>
+        <p:txBody>
+          <a:bodyPr wrap="square" rtlCol="0">
+            <a:spAutoFit/>
+          </a:bodyPr>
+          <a:lstStyle/>
+          <a:p>
+            <a:r>
+              <a:rPr lang="en-US" dirty="0">
+                <a:latin typeface="Times" pitchFamily="2" charset="0"/>
+              </a:rPr>
+              <a:t>Mode 1</a:t>
+            </a:r>
+          </a:p>
+        </p:txBody>
+      </p:sp>
+      <p:pic>
+        <p:nvPicPr>
+          <p:cNvPr id="16" name="Graphic 15" descr="Windy with solid fill">
+            <a:extLst>
+              <a:ext uri="{FF2B5EF4-FFF2-40B4-BE49-F238E27FC236}">
+                <a16:creationId xmlns:a16="http://schemas.microsoft.com/office/drawing/2014/main" id="{9FDE7563-0DBE-9F42-AF1E-DAAC88A4D545}"/>
+              </a:ext>
+            </a:extLst>
+          </p:cNvPr>
+          <p:cNvPicPr>
+            <a:picLocks noChangeAspect="1"/>
+          </p:cNvPicPr>
+          <p:nvPr/>
+        </p:nvPicPr>
+        <p:blipFill>
+          <a:blip r:embed="rId2">
+            <a:extLst>
+              <a:ext uri="{96DAC541-7B7A-43D3-8B79-37D633B846F1}">
+                <asvg:svgBlip xmlns:asvg="http://schemas.microsoft.com/office/drawing/2016/SVG/main" r:embed="rId3"/>
+              </a:ext>
+            </a:extLst>
+          </a:blip>
+          <a:stretch>
+            <a:fillRect/>
+          </a:stretch>
+        </p:blipFill>
+        <p:spPr>
+          <a:xfrm rot="10800000">
+            <a:off x="7597695" y="2835613"/>
+            <a:ext cx="914400" cy="914400"/>
+          </a:xfrm>
+          <a:prstGeom prst="rect">
+            <a:avLst/>
+          </a:prstGeom>
+        </p:spPr>
+      </p:pic>
+      <p:pic>
+        <p:nvPicPr>
+          <p:cNvPr id="18" name="Graphic 17" descr="Wind Turbines with solid fill">
+            <a:extLst>
+              <a:ext uri="{FF2B5EF4-FFF2-40B4-BE49-F238E27FC236}">
+                <a16:creationId xmlns:a16="http://schemas.microsoft.com/office/drawing/2014/main" id="{F11B0A6C-A3ED-B149-877E-1DF601CDCD8E}"/>
+              </a:ext>
+            </a:extLst>
+          </p:cNvPr>
+          <p:cNvPicPr>
+            <a:picLocks noChangeAspect="1"/>
+          </p:cNvPicPr>
+          <p:nvPr/>
+        </p:nvPicPr>
+        <p:blipFill>
+          <a:blip r:embed="rId4">
+            <a:extLst>
+              <a:ext uri="{96DAC541-7B7A-43D3-8B79-37D633B846F1}">
+                <asvg:svgBlip xmlns:asvg="http://schemas.microsoft.com/office/drawing/2016/SVG/main" r:embed="rId5"/>
+              </a:ext>
+            </a:extLst>
+          </a:blip>
+          <a:stretch>
+            <a:fillRect/>
+          </a:stretch>
+        </p:blipFill>
+        <p:spPr>
+          <a:xfrm>
+            <a:off x="8550095" y="2886780"/>
+            <a:ext cx="812066" cy="812066"/>
+          </a:xfrm>
+          <a:prstGeom prst="rect">
+            <a:avLst/>
+          </a:prstGeom>
+        </p:spPr>
+      </p:pic>
+      <p:sp>
+        <p:nvSpPr>
+          <p:cNvPr id="10" name="TextBox 9">
+            <a:extLst>
+              <a:ext uri="{FF2B5EF4-FFF2-40B4-BE49-F238E27FC236}">
+                <a16:creationId xmlns:a16="http://schemas.microsoft.com/office/drawing/2014/main" id="{F0D36253-EB82-614E-97A9-455D1272E3BB}"/>
+              </a:ext>
+            </a:extLst>
+          </p:cNvPr>
+          <p:cNvSpPr txBox="1"/>
+          <p:nvPr/>
+        </p:nvSpPr>
+        <p:spPr>
+          <a:xfrm>
+            <a:off x="6577821" y="5070753"/>
+            <a:ext cx="1019874" cy="369332"/>
+          </a:xfrm>
+          <a:prstGeom prst="rect">
+            <a:avLst/>
+          </a:prstGeom>
+          <a:noFill/>
+        </p:spPr>
+        <p:txBody>
+          <a:bodyPr wrap="square" rtlCol="0">
+            <a:spAutoFit/>
+          </a:bodyPr>
+          <a:lstStyle/>
+          <a:p>
+            <a:r>
+              <a:rPr lang="en-US" dirty="0">
+                <a:latin typeface="Times" pitchFamily="2" charset="0"/>
+              </a:rPr>
+              <a:t>Start</a:t>
+            </a:r>
+          </a:p>
+        </p:txBody>
+      </p:sp>
+      <p:pic>
+        <p:nvPicPr>
+          <p:cNvPr id="11" name="Graphic 10" descr="Star with solid fill">
+            <a:extLst>
+              <a:ext uri="{FF2B5EF4-FFF2-40B4-BE49-F238E27FC236}">
+                <a16:creationId xmlns:a16="http://schemas.microsoft.com/office/drawing/2014/main" id="{BA6FAECC-39D5-4C40-B668-CC67DDA3EA1E}"/>
+              </a:ext>
+            </a:extLst>
+          </p:cNvPr>
+          <p:cNvPicPr>
+            <a:picLocks noChangeAspect="1"/>
+          </p:cNvPicPr>
+          <p:nvPr/>
+        </p:nvPicPr>
+        <p:blipFill>
+          <a:blip r:embed="rId6">
+            <a:extLst>
+              <a:ext uri="{96DAC541-7B7A-43D3-8B79-37D633B846F1}">
+                <asvg:svgBlip xmlns:asvg="http://schemas.microsoft.com/office/drawing/2016/SVG/main" r:embed="rId7"/>
+              </a:ext>
+            </a:extLst>
+          </a:blip>
+          <a:stretch>
+            <a:fillRect/>
+          </a:stretch>
+        </p:blipFill>
+        <p:spPr>
+          <a:xfrm>
+            <a:off x="7298966" y="1351582"/>
+            <a:ext cx="683414" cy="683414"/>
+          </a:xfrm>
+          <a:prstGeom prst="rect">
+            <a:avLst/>
+          </a:prstGeom>
+        </p:spPr>
+      </p:pic>
+      <p:pic>
+        <p:nvPicPr>
+          <p:cNvPr id="12" name="Graphic 11" descr="Quadcopter with solid fill">
+            <a:extLst>
+              <a:ext uri="{FF2B5EF4-FFF2-40B4-BE49-F238E27FC236}">
+                <a16:creationId xmlns:a16="http://schemas.microsoft.com/office/drawing/2014/main" id="{0C41AA66-22DF-8A47-896A-105A30E58DAB}"/>
+              </a:ext>
+            </a:extLst>
+          </p:cNvPr>
+          <p:cNvPicPr>
+            <a:picLocks noChangeAspect="1"/>
+          </p:cNvPicPr>
+          <p:nvPr/>
+        </p:nvPicPr>
+        <p:blipFill>
+          <a:blip r:embed="rId8">
+            <a:extLst>
+              <a:ext uri="{96DAC541-7B7A-43D3-8B79-37D633B846F1}">
+                <asvg:svgBlip xmlns:asvg="http://schemas.microsoft.com/office/drawing/2016/SVG/main" r:embed="rId9"/>
+              </a:ext>
+            </a:extLst>
+          </a:blip>
+          <a:stretch>
+            <a:fillRect/>
+          </a:stretch>
+        </p:blipFill>
+        <p:spPr>
+          <a:xfrm>
+            <a:off x="6419350" y="4330560"/>
+            <a:ext cx="914400" cy="914400"/>
+          </a:xfrm>
+          <a:prstGeom prst="rect">
+            <a:avLst/>
+          </a:prstGeom>
+        </p:spPr>
+      </p:pic>
+      <p:sp>
+        <p:nvSpPr>
+          <p:cNvPr id="13" name="TextBox 12">
+            <a:extLst>
+              <a:ext uri="{FF2B5EF4-FFF2-40B4-BE49-F238E27FC236}">
+                <a16:creationId xmlns:a16="http://schemas.microsoft.com/office/drawing/2014/main" id="{1ACEEAA5-69E2-FF46-ABE3-520370D00DEA}"/>
+              </a:ext>
+            </a:extLst>
+          </p:cNvPr>
+          <p:cNvSpPr txBox="1"/>
+          <p:nvPr/>
+        </p:nvSpPr>
+        <p:spPr>
+          <a:xfrm>
+            <a:off x="7271010" y="1995104"/>
+            <a:ext cx="1112226" cy="369332"/>
+          </a:xfrm>
+          <a:prstGeom prst="rect">
+            <a:avLst/>
+          </a:prstGeom>
+          <a:noFill/>
+        </p:spPr>
+        <p:txBody>
+          <a:bodyPr wrap="square" rtlCol="0">
+            <a:spAutoFit/>
+          </a:bodyPr>
+          <a:lstStyle/>
+          <a:p>
+            <a:r>
+              <a:rPr lang="en-US" dirty="0">
+                <a:latin typeface="Times" pitchFamily="2" charset="0"/>
+              </a:rPr>
+              <a:t>Target</a:t>
+            </a:r>
+          </a:p>
+        </p:txBody>
+      </p:sp>
+    </p:spTree>
+    <p:extLst>
+      <p:ext uri="{BB962C8B-B14F-4D97-AF65-F5344CB8AC3E}">
+        <p14:creationId xmlns:p14="http://schemas.microsoft.com/office/powerpoint/2010/main" val="230683699"/>
+      </p:ext>
+    </p:extLst>
+  </p:cSld>
+  <p:clrMapOvr>
+    <a:masterClrMapping/>
+  </p:clrMapOvr>
+</p:sld>
+</file>
+
+<file path=ppt/slides/slide16.xml><?xml version="1.0" encoding="utf-8"?>
+<p:sld xmlns:a="http://schemas.openxmlformats.org/drawingml/2006/main" xmlns:r="http://schemas.openxmlformats.org/officeDocument/2006/relationships" xmlns:p="http://schemas.openxmlformats.org/presentationml/2006/main">
+  <p:cSld>
+    <p:spTree>
+      <p:nvGrpSpPr>
+        <p:cNvPr id="1" name=""/>
+        <p:cNvGrpSpPr/>
+        <p:nvPr/>
+      </p:nvGrpSpPr>
+      <p:grpSpPr>
+        <a:xfrm>
+          <a:off x="0" y="0"/>
+          <a:ext cx="0" cy="0"/>
+          <a:chOff x="0" y="0"/>
+          <a:chExt cx="0" cy="0"/>
+        </a:xfrm>
+      </p:grpSpPr>
+      <p:sp>
+        <p:nvSpPr>
+          <p:cNvPr id="2" name="Rectangle 1">
+            <a:extLst>
+              <a:ext uri="{FF2B5EF4-FFF2-40B4-BE49-F238E27FC236}">
+                <a16:creationId xmlns:a16="http://schemas.microsoft.com/office/drawing/2014/main" id="{5CF3775B-C1FD-F147-9996-7528BDA0F34E}"/>
+              </a:ext>
+            </a:extLst>
+          </p:cNvPr>
+          <p:cNvSpPr/>
+          <p:nvPr/>
+        </p:nvSpPr>
+        <p:spPr>
+          <a:xfrm>
+            <a:off x="2705100" y="1213338"/>
+            <a:ext cx="6781800" cy="4369777"/>
+          </a:xfrm>
+          <a:prstGeom prst="rect">
+            <a:avLst/>
+          </a:prstGeom>
+          <a:solidFill>
+            <a:schemeClr val="tx2">
+              <a:lumMod val="40000"/>
+              <a:lumOff val="60000"/>
+            </a:schemeClr>
+          </a:solidFill>
+          <a:ln>
+            <a:noFill/>
+          </a:ln>
+        </p:spPr>
+        <p:style>
+          <a:lnRef idx="2">
+            <a:schemeClr val="accent1">
+              <a:shade val="50000"/>
+            </a:schemeClr>
+          </a:lnRef>
+          <a:fillRef idx="1">
+            <a:schemeClr val="accent1"/>
+          </a:fillRef>
+          <a:effectRef idx="0">
+            <a:schemeClr val="accent1"/>
+          </a:effectRef>
+          <a:fontRef idx="minor">
+            <a:schemeClr val="lt1"/>
+          </a:fontRef>
+        </p:style>
+        <p:txBody>
+          <a:bodyPr rtlCol="0" anchor="ctr"/>
+          <a:lstStyle/>
+          <a:p>
+            <a:pPr algn="ctr"/>
+            <a:endParaRPr lang="en-US" dirty="0">
+              <a:latin typeface="Times" pitchFamily="2" charset="0"/>
+            </a:endParaRPr>
+          </a:p>
+        </p:txBody>
+      </p:sp>
+      <p:sp>
+        <p:nvSpPr>
+          <p:cNvPr id="3" name="Rectangle 2">
+            <a:extLst>
+              <a:ext uri="{FF2B5EF4-FFF2-40B4-BE49-F238E27FC236}">
+                <a16:creationId xmlns:a16="http://schemas.microsoft.com/office/drawing/2014/main" id="{70F637E1-41AA-0A44-A1AF-B9603B1AF2C5}"/>
+              </a:ext>
+            </a:extLst>
+          </p:cNvPr>
+          <p:cNvSpPr/>
+          <p:nvPr/>
+        </p:nvSpPr>
+        <p:spPr>
+          <a:xfrm rot="5400000">
+            <a:off x="6597161" y="1209345"/>
+            <a:ext cx="1515208" cy="4264269"/>
+          </a:xfrm>
+          <a:prstGeom prst="rect">
+            <a:avLst/>
+          </a:prstGeom>
+          <a:solidFill>
+            <a:schemeClr val="accent6">
+              <a:lumMod val="40000"/>
+              <a:lumOff val="60000"/>
+            </a:schemeClr>
+          </a:solidFill>
+          <a:ln>
+            <a:noFill/>
+          </a:ln>
+        </p:spPr>
+        <p:style>
+          <a:lnRef idx="2">
+            <a:schemeClr val="accent1">
+              <a:shade val="50000"/>
+            </a:schemeClr>
+          </a:lnRef>
+          <a:fillRef idx="1">
+            <a:schemeClr val="accent1"/>
+          </a:fillRef>
+          <a:effectRef idx="0">
+            <a:schemeClr val="accent1"/>
+          </a:effectRef>
+          <a:fontRef idx="minor">
+            <a:schemeClr val="lt1"/>
+          </a:fontRef>
+        </p:style>
+        <p:txBody>
+          <a:bodyPr rtlCol="0" anchor="ctr"/>
+          <a:lstStyle/>
+          <a:p>
+            <a:pPr algn="ctr"/>
+            <a:endParaRPr lang="en-US"/>
+          </a:p>
+        </p:txBody>
+      </p:sp>
+      <p:sp>
+        <p:nvSpPr>
+          <p:cNvPr id="6" name="TextBox 5">
+            <a:extLst>
+              <a:ext uri="{FF2B5EF4-FFF2-40B4-BE49-F238E27FC236}">
+                <a16:creationId xmlns:a16="http://schemas.microsoft.com/office/drawing/2014/main" id="{E9582660-A23C-BF4A-ABB6-4F9600478D81}"/>
+              </a:ext>
+            </a:extLst>
+          </p:cNvPr>
+          <p:cNvSpPr txBox="1"/>
+          <p:nvPr/>
+        </p:nvSpPr>
+        <p:spPr>
+          <a:xfrm>
+            <a:off x="7266661" y="3729752"/>
+            <a:ext cx="1112226" cy="369332"/>
+          </a:xfrm>
+          <a:prstGeom prst="rect">
+            <a:avLst/>
+          </a:prstGeom>
+          <a:noFill/>
+        </p:spPr>
+        <p:txBody>
+          <a:bodyPr wrap="square" rtlCol="0">
+            <a:spAutoFit/>
+          </a:bodyPr>
+          <a:lstStyle/>
+          <a:p>
+            <a:r>
+              <a:rPr lang="en-US" dirty="0">
+                <a:latin typeface="Times" pitchFamily="2" charset="0"/>
+              </a:rPr>
+              <a:t>Mode 2</a:t>
+            </a:r>
+          </a:p>
+        </p:txBody>
+      </p:sp>
+      <p:sp>
+        <p:nvSpPr>
+          <p:cNvPr id="7" name="TextBox 6">
+            <a:extLst>
+              <a:ext uri="{FF2B5EF4-FFF2-40B4-BE49-F238E27FC236}">
+                <a16:creationId xmlns:a16="http://schemas.microsoft.com/office/drawing/2014/main" id="{9812938F-9D59-FD44-80ED-6DEC72242200}"/>
+              </a:ext>
+            </a:extLst>
+          </p:cNvPr>
+          <p:cNvSpPr txBox="1"/>
+          <p:nvPr/>
+        </p:nvSpPr>
+        <p:spPr>
+          <a:xfrm>
+            <a:off x="8550095" y="5233397"/>
+            <a:ext cx="1112226" cy="369332"/>
+          </a:xfrm>
+          <a:prstGeom prst="rect">
+            <a:avLst/>
+          </a:prstGeom>
+          <a:noFill/>
+        </p:spPr>
+        <p:txBody>
+          <a:bodyPr wrap="square" rtlCol="0">
+            <a:spAutoFit/>
+          </a:bodyPr>
+          <a:lstStyle/>
+          <a:p>
+            <a:r>
+              <a:rPr lang="en-US" dirty="0">
+                <a:latin typeface="Times" pitchFamily="2" charset="0"/>
+              </a:rPr>
+              <a:t>Mode 1</a:t>
+            </a:r>
+          </a:p>
+        </p:txBody>
+      </p:sp>
+      <p:pic>
+        <p:nvPicPr>
+          <p:cNvPr id="16" name="Graphic 15" descr="Windy with solid fill">
+            <a:extLst>
+              <a:ext uri="{FF2B5EF4-FFF2-40B4-BE49-F238E27FC236}">
+                <a16:creationId xmlns:a16="http://schemas.microsoft.com/office/drawing/2014/main" id="{9FDE7563-0DBE-9F42-AF1E-DAAC88A4D545}"/>
+              </a:ext>
+            </a:extLst>
+          </p:cNvPr>
+          <p:cNvPicPr>
+            <a:picLocks noChangeAspect="1"/>
+          </p:cNvPicPr>
+          <p:nvPr/>
+        </p:nvPicPr>
+        <p:blipFill>
+          <a:blip r:embed="rId2">
+            <a:extLst>
+              <a:ext uri="{96DAC541-7B7A-43D3-8B79-37D633B846F1}">
+                <asvg:svgBlip xmlns:asvg="http://schemas.microsoft.com/office/drawing/2016/SVG/main" r:embed="rId3"/>
+              </a:ext>
+            </a:extLst>
+          </a:blip>
+          <a:stretch>
+            <a:fillRect/>
+          </a:stretch>
+        </p:blipFill>
+        <p:spPr>
+          <a:xfrm rot="10800000">
+            <a:off x="7597695" y="2835613"/>
+            <a:ext cx="914400" cy="914400"/>
+          </a:xfrm>
+          <a:prstGeom prst="rect">
+            <a:avLst/>
+          </a:prstGeom>
+        </p:spPr>
+      </p:pic>
+      <p:pic>
+        <p:nvPicPr>
+          <p:cNvPr id="18" name="Graphic 17" descr="Wind Turbines with solid fill">
+            <a:extLst>
+              <a:ext uri="{FF2B5EF4-FFF2-40B4-BE49-F238E27FC236}">
+                <a16:creationId xmlns:a16="http://schemas.microsoft.com/office/drawing/2014/main" id="{F11B0A6C-A3ED-B149-877E-1DF601CDCD8E}"/>
+              </a:ext>
+            </a:extLst>
+          </p:cNvPr>
+          <p:cNvPicPr>
+            <a:picLocks noChangeAspect="1"/>
+          </p:cNvPicPr>
+          <p:nvPr/>
+        </p:nvPicPr>
+        <p:blipFill>
+          <a:blip r:embed="rId4">
+            <a:extLst>
+              <a:ext uri="{96DAC541-7B7A-43D3-8B79-37D633B846F1}">
+                <asvg:svgBlip xmlns:asvg="http://schemas.microsoft.com/office/drawing/2016/SVG/main" r:embed="rId5"/>
+              </a:ext>
+            </a:extLst>
+          </a:blip>
+          <a:stretch>
+            <a:fillRect/>
+          </a:stretch>
+        </p:blipFill>
+        <p:spPr>
+          <a:xfrm>
+            <a:off x="8550095" y="2886780"/>
+            <a:ext cx="812066" cy="812066"/>
+          </a:xfrm>
+          <a:prstGeom prst="rect">
+            <a:avLst/>
+          </a:prstGeom>
+        </p:spPr>
+      </p:pic>
+      <p:sp>
+        <p:nvSpPr>
+          <p:cNvPr id="10" name="TextBox 9">
+            <a:extLst>
+              <a:ext uri="{FF2B5EF4-FFF2-40B4-BE49-F238E27FC236}">
+                <a16:creationId xmlns:a16="http://schemas.microsoft.com/office/drawing/2014/main" id="{F0D36253-EB82-614E-97A9-455D1272E3BB}"/>
+              </a:ext>
+            </a:extLst>
+          </p:cNvPr>
+          <p:cNvSpPr txBox="1"/>
+          <p:nvPr/>
+        </p:nvSpPr>
+        <p:spPr>
+          <a:xfrm>
+            <a:off x="6577821" y="5070753"/>
+            <a:ext cx="1019874" cy="369332"/>
+          </a:xfrm>
+          <a:prstGeom prst="rect">
+            <a:avLst/>
+          </a:prstGeom>
+          <a:noFill/>
+        </p:spPr>
+        <p:txBody>
+          <a:bodyPr wrap="square" rtlCol="0">
+            <a:spAutoFit/>
+          </a:bodyPr>
+          <a:lstStyle/>
+          <a:p>
+            <a:r>
+              <a:rPr lang="en-US" dirty="0">
+                <a:latin typeface="Times" pitchFamily="2" charset="0"/>
+              </a:rPr>
+              <a:t>Start</a:t>
+            </a:r>
+          </a:p>
+        </p:txBody>
+      </p:sp>
+      <p:pic>
+        <p:nvPicPr>
+          <p:cNvPr id="11" name="Graphic 10" descr="Star with solid fill">
+            <a:extLst>
+              <a:ext uri="{FF2B5EF4-FFF2-40B4-BE49-F238E27FC236}">
+                <a16:creationId xmlns:a16="http://schemas.microsoft.com/office/drawing/2014/main" id="{BA6FAECC-39D5-4C40-B668-CC67DDA3EA1E}"/>
+              </a:ext>
+            </a:extLst>
+          </p:cNvPr>
+          <p:cNvPicPr>
+            <a:picLocks noChangeAspect="1"/>
+          </p:cNvPicPr>
+          <p:nvPr/>
+        </p:nvPicPr>
+        <p:blipFill>
+          <a:blip r:embed="rId6">
+            <a:extLst>
+              <a:ext uri="{96DAC541-7B7A-43D3-8B79-37D633B846F1}">
+                <asvg:svgBlip xmlns:asvg="http://schemas.microsoft.com/office/drawing/2016/SVG/main" r:embed="rId7"/>
+              </a:ext>
+            </a:extLst>
+          </a:blip>
+          <a:stretch>
+            <a:fillRect/>
+          </a:stretch>
+        </p:blipFill>
+        <p:spPr>
+          <a:xfrm>
+            <a:off x="7298966" y="1351582"/>
+            <a:ext cx="683414" cy="683414"/>
+          </a:xfrm>
+          <a:prstGeom prst="rect">
+            <a:avLst/>
+          </a:prstGeom>
+        </p:spPr>
+      </p:pic>
+      <p:pic>
+        <p:nvPicPr>
+          <p:cNvPr id="12" name="Graphic 11" descr="Quadcopter with solid fill">
+            <a:extLst>
+              <a:ext uri="{FF2B5EF4-FFF2-40B4-BE49-F238E27FC236}">
+                <a16:creationId xmlns:a16="http://schemas.microsoft.com/office/drawing/2014/main" id="{0C41AA66-22DF-8A47-896A-105A30E58DAB}"/>
+              </a:ext>
+            </a:extLst>
+          </p:cNvPr>
+          <p:cNvPicPr>
+            <a:picLocks noChangeAspect="1"/>
+          </p:cNvPicPr>
+          <p:nvPr/>
+        </p:nvPicPr>
+        <p:blipFill>
+          <a:blip r:embed="rId8">
+            <a:extLst>
+              <a:ext uri="{96DAC541-7B7A-43D3-8B79-37D633B846F1}">
+                <asvg:svgBlip xmlns:asvg="http://schemas.microsoft.com/office/drawing/2016/SVG/main" r:embed="rId9"/>
+              </a:ext>
+            </a:extLst>
+          </a:blip>
+          <a:stretch>
+            <a:fillRect/>
+          </a:stretch>
+        </p:blipFill>
+        <p:spPr>
+          <a:xfrm>
+            <a:off x="6419350" y="4330560"/>
+            <a:ext cx="914400" cy="914400"/>
+          </a:xfrm>
+          <a:prstGeom prst="rect">
+            <a:avLst/>
+          </a:prstGeom>
+        </p:spPr>
+      </p:pic>
+      <p:sp>
+        <p:nvSpPr>
+          <p:cNvPr id="13" name="TextBox 12">
+            <a:extLst>
+              <a:ext uri="{FF2B5EF4-FFF2-40B4-BE49-F238E27FC236}">
+                <a16:creationId xmlns:a16="http://schemas.microsoft.com/office/drawing/2014/main" id="{1ACEEAA5-69E2-FF46-ABE3-520370D00DEA}"/>
+              </a:ext>
+            </a:extLst>
+          </p:cNvPr>
+          <p:cNvSpPr txBox="1"/>
+          <p:nvPr/>
+        </p:nvSpPr>
+        <p:spPr>
+          <a:xfrm>
+            <a:off x="7271010" y="1995104"/>
+            <a:ext cx="1112226" cy="369332"/>
+          </a:xfrm>
+          <a:prstGeom prst="rect">
+            <a:avLst/>
+          </a:prstGeom>
+          <a:noFill/>
+        </p:spPr>
+        <p:txBody>
+          <a:bodyPr wrap="square" rtlCol="0">
+            <a:spAutoFit/>
+          </a:bodyPr>
+          <a:lstStyle/>
+          <a:p>
+            <a:r>
+              <a:rPr lang="en-US" dirty="0">
+                <a:latin typeface="Times" pitchFamily="2" charset="0"/>
+              </a:rPr>
+              <a:t>Target</a:t>
+            </a:r>
+          </a:p>
+        </p:txBody>
+      </p:sp>
+      <p:sp>
+        <p:nvSpPr>
+          <p:cNvPr id="15" name="Freeform 14">
+            <a:extLst>
+              <a:ext uri="{FF2B5EF4-FFF2-40B4-BE49-F238E27FC236}">
+                <a16:creationId xmlns:a16="http://schemas.microsoft.com/office/drawing/2014/main" id="{D3F6ABEF-680F-4D03-C7C1-9CA5EB3F14D8}"/>
+              </a:ext>
+            </a:extLst>
+          </p:cNvPr>
+          <p:cNvSpPr/>
+          <p:nvPr/>
+        </p:nvSpPr>
+        <p:spPr>
+          <a:xfrm>
+            <a:off x="6786009" y="3628248"/>
+            <a:ext cx="63199" cy="829452"/>
+          </a:xfrm>
+          <a:custGeom>
+            <a:avLst/>
+            <a:gdLst>
+              <a:gd name="connsiteX0" fmla="*/ 63199 w 63199"/>
+              <a:gd name="connsiteY0" fmla="*/ 829452 h 829452"/>
+              <a:gd name="connsiteX1" fmla="*/ 1653 w 63199"/>
+              <a:gd name="connsiteY1" fmla="*/ 433798 h 829452"/>
+              <a:gd name="connsiteX2" fmla="*/ 19237 w 63199"/>
+              <a:gd name="connsiteY2" fmla="*/ 90898 h 829452"/>
+              <a:gd name="connsiteX3" fmla="*/ 36822 w 63199"/>
+              <a:gd name="connsiteY3" fmla="*/ 11767 h 829452"/>
+            </a:gdLst>
+            <a:ahLst/>
+            <a:cxnLst>
+              <a:cxn ang="0">
+                <a:pos x="connsiteX0" y="connsiteY0"/>
+              </a:cxn>
+              <a:cxn ang="0">
+                <a:pos x="connsiteX1" y="connsiteY1"/>
+              </a:cxn>
+              <a:cxn ang="0">
+                <a:pos x="connsiteX2" y="connsiteY2"/>
+              </a:cxn>
+              <a:cxn ang="0">
+                <a:pos x="connsiteX3" y="connsiteY3"/>
+              </a:cxn>
+            </a:cxnLst>
+            <a:rect l="l" t="t" r="r" b="b"/>
+            <a:pathLst>
+              <a:path w="63199" h="829452">
+                <a:moveTo>
+                  <a:pt x="63199" y="829452"/>
+                </a:moveTo>
+                <a:cubicBezTo>
+                  <a:pt x="36089" y="693171"/>
+                  <a:pt x="8980" y="556890"/>
+                  <a:pt x="1653" y="433798"/>
+                </a:cubicBezTo>
+                <a:cubicBezTo>
+                  <a:pt x="-5674" y="310706"/>
+                  <a:pt x="13376" y="161236"/>
+                  <a:pt x="19237" y="90898"/>
+                </a:cubicBezTo>
+                <a:cubicBezTo>
+                  <a:pt x="25098" y="20560"/>
+                  <a:pt x="13376" y="-21937"/>
+                  <a:pt x="36822" y="11767"/>
+                </a:cubicBezTo>
+              </a:path>
+            </a:pathLst>
+          </a:custGeom>
+          <a:noFill/>
+        </p:spPr>
+        <p:style>
+          <a:lnRef idx="2">
+            <a:schemeClr val="accent1">
+              <a:shade val="50000"/>
+            </a:schemeClr>
+          </a:lnRef>
+          <a:fillRef idx="1">
+            <a:schemeClr val="accent1"/>
+          </a:fillRef>
+          <a:effectRef idx="0">
+            <a:schemeClr val="accent1"/>
+          </a:effectRef>
+          <a:fontRef idx="minor">
+            <a:schemeClr val="lt1"/>
+          </a:fontRef>
+        </p:style>
+        <p:txBody>
+          <a:bodyPr rtlCol="0" anchor="ctr"/>
+          <a:lstStyle/>
+          <a:p>
+            <a:pPr algn="ctr"/>
+            <a:endParaRPr lang="en-US"/>
+          </a:p>
+        </p:txBody>
+      </p:sp>
+    </p:spTree>
+    <p:extLst>
+      <p:ext uri="{BB962C8B-B14F-4D97-AF65-F5344CB8AC3E}">
+        <p14:creationId xmlns:p14="http://schemas.microsoft.com/office/powerpoint/2010/main" val="3311085588"/>
+      </p:ext>
+    </p:extLst>
+  </p:cSld>
+  <p:clrMapOvr>
+    <a:masterClrMapping/>
+  </p:clrMapOvr>
+</p:sld>
+</file>
+
+<file path=ppt/slides/slide17.xml><?xml version="1.0" encoding="utf-8"?>
+<p:sld xmlns:a="http://schemas.openxmlformats.org/drawingml/2006/main" xmlns:r="http://schemas.openxmlformats.org/officeDocument/2006/relationships" xmlns:p="http://schemas.openxmlformats.org/presentationml/2006/main">
+  <p:cSld>
+    <p:spTree>
+      <p:nvGrpSpPr>
+        <p:cNvPr id="1" name=""/>
+        <p:cNvGrpSpPr/>
+        <p:nvPr/>
+      </p:nvGrpSpPr>
+      <p:grpSpPr>
+        <a:xfrm>
+          <a:off x="0" y="0"/>
+          <a:ext cx="0" cy="0"/>
+          <a:chOff x="0" y="0"/>
+          <a:chExt cx="0" cy="0"/>
+        </a:xfrm>
+      </p:grpSpPr>
+      <p:sp>
+        <p:nvSpPr>
+          <p:cNvPr id="2" name="Rectangle 1">
+            <a:extLst>
+              <a:ext uri="{FF2B5EF4-FFF2-40B4-BE49-F238E27FC236}">
+                <a16:creationId xmlns:a16="http://schemas.microsoft.com/office/drawing/2014/main" id="{5CF3775B-C1FD-F147-9996-7528BDA0F34E}"/>
+              </a:ext>
+            </a:extLst>
+          </p:cNvPr>
+          <p:cNvSpPr/>
+          <p:nvPr/>
+        </p:nvSpPr>
+        <p:spPr>
+          <a:xfrm>
+            <a:off x="2705100" y="1213338"/>
+            <a:ext cx="6781800" cy="4369777"/>
+          </a:xfrm>
+          <a:prstGeom prst="rect">
+            <a:avLst/>
+          </a:prstGeom>
+          <a:solidFill>
+            <a:schemeClr val="tx2">
+              <a:lumMod val="40000"/>
+              <a:lumOff val="60000"/>
+            </a:schemeClr>
+          </a:solidFill>
+          <a:ln>
+            <a:noFill/>
+          </a:ln>
+        </p:spPr>
+        <p:style>
+          <a:lnRef idx="2">
+            <a:schemeClr val="accent1">
+              <a:shade val="50000"/>
+            </a:schemeClr>
+          </a:lnRef>
+          <a:fillRef idx="1">
+            <a:schemeClr val="accent1"/>
+          </a:fillRef>
+          <a:effectRef idx="0">
+            <a:schemeClr val="accent1"/>
+          </a:effectRef>
+          <a:fontRef idx="minor">
+            <a:schemeClr val="lt1"/>
+          </a:fontRef>
+        </p:style>
+        <p:txBody>
+          <a:bodyPr rtlCol="0" anchor="ctr"/>
+          <a:lstStyle/>
+          <a:p>
+            <a:pPr algn="ctr"/>
+            <a:endParaRPr lang="en-US" dirty="0">
+              <a:latin typeface="Times" pitchFamily="2" charset="0"/>
+            </a:endParaRPr>
+          </a:p>
+        </p:txBody>
+      </p:sp>
+      <p:sp>
+        <p:nvSpPr>
+          <p:cNvPr id="3" name="Rectangle 2">
+            <a:extLst>
+              <a:ext uri="{FF2B5EF4-FFF2-40B4-BE49-F238E27FC236}">
+                <a16:creationId xmlns:a16="http://schemas.microsoft.com/office/drawing/2014/main" id="{70F637E1-41AA-0A44-A1AF-B9603B1AF2C5}"/>
+              </a:ext>
+            </a:extLst>
+          </p:cNvPr>
+          <p:cNvSpPr/>
+          <p:nvPr/>
+        </p:nvSpPr>
+        <p:spPr>
+          <a:xfrm rot="5400000">
+            <a:off x="6597161" y="1209345"/>
+            <a:ext cx="1515208" cy="4264269"/>
+          </a:xfrm>
+          <a:prstGeom prst="rect">
+            <a:avLst/>
+          </a:prstGeom>
+          <a:solidFill>
+            <a:schemeClr val="accent6">
+              <a:lumMod val="40000"/>
+              <a:lumOff val="60000"/>
+            </a:schemeClr>
+          </a:solidFill>
+          <a:ln>
+            <a:noFill/>
+          </a:ln>
+        </p:spPr>
+        <p:style>
+          <a:lnRef idx="2">
+            <a:schemeClr val="accent1">
+              <a:shade val="50000"/>
+            </a:schemeClr>
+          </a:lnRef>
+          <a:fillRef idx="1">
+            <a:schemeClr val="accent1"/>
+          </a:fillRef>
+          <a:effectRef idx="0">
+            <a:schemeClr val="accent1"/>
+          </a:effectRef>
+          <a:fontRef idx="minor">
+            <a:schemeClr val="lt1"/>
+          </a:fontRef>
+        </p:style>
+        <p:txBody>
+          <a:bodyPr rtlCol="0" anchor="ctr"/>
+          <a:lstStyle/>
+          <a:p>
+            <a:pPr algn="ctr"/>
+            <a:endParaRPr lang="en-US"/>
+          </a:p>
+        </p:txBody>
+      </p:sp>
+      <p:sp>
+        <p:nvSpPr>
+          <p:cNvPr id="6" name="TextBox 5">
+            <a:extLst>
+              <a:ext uri="{FF2B5EF4-FFF2-40B4-BE49-F238E27FC236}">
+                <a16:creationId xmlns:a16="http://schemas.microsoft.com/office/drawing/2014/main" id="{E9582660-A23C-BF4A-ABB6-4F9600478D81}"/>
+              </a:ext>
+            </a:extLst>
+          </p:cNvPr>
+          <p:cNvSpPr txBox="1"/>
+          <p:nvPr/>
+        </p:nvSpPr>
+        <p:spPr>
+          <a:xfrm>
+            <a:off x="7266661" y="3729752"/>
+            <a:ext cx="1112226" cy="369332"/>
+          </a:xfrm>
+          <a:prstGeom prst="rect">
+            <a:avLst/>
+          </a:prstGeom>
+          <a:noFill/>
+        </p:spPr>
+        <p:txBody>
+          <a:bodyPr wrap="square" rtlCol="0">
+            <a:spAutoFit/>
+          </a:bodyPr>
+          <a:lstStyle/>
+          <a:p>
+            <a:r>
+              <a:rPr lang="en-US" dirty="0">
+                <a:latin typeface="Times" pitchFamily="2" charset="0"/>
+              </a:rPr>
+              <a:t>Mode 2</a:t>
+            </a:r>
+          </a:p>
+        </p:txBody>
+      </p:sp>
+      <p:sp>
+        <p:nvSpPr>
+          <p:cNvPr id="7" name="TextBox 6">
+            <a:extLst>
+              <a:ext uri="{FF2B5EF4-FFF2-40B4-BE49-F238E27FC236}">
+                <a16:creationId xmlns:a16="http://schemas.microsoft.com/office/drawing/2014/main" id="{9812938F-9D59-FD44-80ED-6DEC72242200}"/>
+              </a:ext>
+            </a:extLst>
+          </p:cNvPr>
+          <p:cNvSpPr txBox="1"/>
+          <p:nvPr/>
+        </p:nvSpPr>
+        <p:spPr>
+          <a:xfrm>
+            <a:off x="8550095" y="5233397"/>
+            <a:ext cx="1112226" cy="369332"/>
+          </a:xfrm>
+          <a:prstGeom prst="rect">
+            <a:avLst/>
+          </a:prstGeom>
+          <a:noFill/>
+        </p:spPr>
+        <p:txBody>
+          <a:bodyPr wrap="square" rtlCol="0">
+            <a:spAutoFit/>
+          </a:bodyPr>
+          <a:lstStyle/>
+          <a:p>
+            <a:r>
+              <a:rPr lang="en-US" dirty="0">
+                <a:latin typeface="Times" pitchFamily="2" charset="0"/>
+              </a:rPr>
+              <a:t>Mode 1</a:t>
+            </a:r>
+          </a:p>
+        </p:txBody>
+      </p:sp>
+      <p:pic>
+        <p:nvPicPr>
+          <p:cNvPr id="16" name="Graphic 15" descr="Windy with solid fill">
+            <a:extLst>
+              <a:ext uri="{FF2B5EF4-FFF2-40B4-BE49-F238E27FC236}">
+                <a16:creationId xmlns:a16="http://schemas.microsoft.com/office/drawing/2014/main" id="{9FDE7563-0DBE-9F42-AF1E-DAAC88A4D545}"/>
+              </a:ext>
+            </a:extLst>
+          </p:cNvPr>
+          <p:cNvPicPr>
+            <a:picLocks noChangeAspect="1"/>
+          </p:cNvPicPr>
+          <p:nvPr/>
+        </p:nvPicPr>
+        <p:blipFill>
+          <a:blip r:embed="rId2">
+            <a:extLst>
+              <a:ext uri="{96DAC541-7B7A-43D3-8B79-37D633B846F1}">
+                <asvg:svgBlip xmlns:asvg="http://schemas.microsoft.com/office/drawing/2016/SVG/main" r:embed="rId3"/>
+              </a:ext>
+            </a:extLst>
+          </a:blip>
+          <a:stretch>
+            <a:fillRect/>
+          </a:stretch>
+        </p:blipFill>
+        <p:spPr>
+          <a:xfrm rot="10800000">
+            <a:off x="7597695" y="2835613"/>
+            <a:ext cx="914400" cy="914400"/>
+          </a:xfrm>
+          <a:prstGeom prst="rect">
+            <a:avLst/>
+          </a:prstGeom>
+        </p:spPr>
+      </p:pic>
+      <p:pic>
+        <p:nvPicPr>
+          <p:cNvPr id="18" name="Graphic 17" descr="Wind Turbines with solid fill">
+            <a:extLst>
+              <a:ext uri="{FF2B5EF4-FFF2-40B4-BE49-F238E27FC236}">
+                <a16:creationId xmlns:a16="http://schemas.microsoft.com/office/drawing/2014/main" id="{F11B0A6C-A3ED-B149-877E-1DF601CDCD8E}"/>
+              </a:ext>
+            </a:extLst>
+          </p:cNvPr>
+          <p:cNvPicPr>
+            <a:picLocks noChangeAspect="1"/>
+          </p:cNvPicPr>
+          <p:nvPr/>
+        </p:nvPicPr>
+        <p:blipFill>
+          <a:blip r:embed="rId4">
+            <a:extLst>
+              <a:ext uri="{96DAC541-7B7A-43D3-8B79-37D633B846F1}">
+                <asvg:svgBlip xmlns:asvg="http://schemas.microsoft.com/office/drawing/2016/SVG/main" r:embed="rId5"/>
+              </a:ext>
+            </a:extLst>
+          </a:blip>
+          <a:stretch>
+            <a:fillRect/>
+          </a:stretch>
+        </p:blipFill>
+        <p:spPr>
+          <a:xfrm>
+            <a:off x="8550095" y="2886780"/>
+            <a:ext cx="812066" cy="812066"/>
+          </a:xfrm>
+          <a:prstGeom prst="rect">
+            <a:avLst/>
+          </a:prstGeom>
+        </p:spPr>
+      </p:pic>
+      <p:sp>
+        <p:nvSpPr>
+          <p:cNvPr id="10" name="TextBox 9">
+            <a:extLst>
+              <a:ext uri="{FF2B5EF4-FFF2-40B4-BE49-F238E27FC236}">
+                <a16:creationId xmlns:a16="http://schemas.microsoft.com/office/drawing/2014/main" id="{F0D36253-EB82-614E-97A9-455D1272E3BB}"/>
+              </a:ext>
+            </a:extLst>
+          </p:cNvPr>
+          <p:cNvSpPr txBox="1"/>
+          <p:nvPr/>
+        </p:nvSpPr>
+        <p:spPr>
+          <a:xfrm>
+            <a:off x="6577821" y="5070753"/>
+            <a:ext cx="1019874" cy="369332"/>
+          </a:xfrm>
+          <a:prstGeom prst="rect">
+            <a:avLst/>
+          </a:prstGeom>
+          <a:noFill/>
+        </p:spPr>
+        <p:txBody>
+          <a:bodyPr wrap="square" rtlCol="0">
+            <a:spAutoFit/>
+          </a:bodyPr>
+          <a:lstStyle/>
+          <a:p>
+            <a:r>
+              <a:rPr lang="en-US" dirty="0">
+                <a:latin typeface="Times" pitchFamily="2" charset="0"/>
+              </a:rPr>
+              <a:t>Start</a:t>
+            </a:r>
+          </a:p>
+        </p:txBody>
+      </p:sp>
+      <p:pic>
+        <p:nvPicPr>
+          <p:cNvPr id="11" name="Graphic 10" descr="Star with solid fill">
+            <a:extLst>
+              <a:ext uri="{FF2B5EF4-FFF2-40B4-BE49-F238E27FC236}">
+                <a16:creationId xmlns:a16="http://schemas.microsoft.com/office/drawing/2014/main" id="{BA6FAECC-39D5-4C40-B668-CC67DDA3EA1E}"/>
+              </a:ext>
+            </a:extLst>
+          </p:cNvPr>
+          <p:cNvPicPr>
+            <a:picLocks noChangeAspect="1"/>
+          </p:cNvPicPr>
+          <p:nvPr/>
+        </p:nvPicPr>
+        <p:blipFill>
+          <a:blip r:embed="rId6">
+            <a:extLst>
+              <a:ext uri="{96DAC541-7B7A-43D3-8B79-37D633B846F1}">
+                <asvg:svgBlip xmlns:asvg="http://schemas.microsoft.com/office/drawing/2016/SVG/main" r:embed="rId7"/>
+              </a:ext>
+            </a:extLst>
+          </a:blip>
+          <a:stretch>
+            <a:fillRect/>
+          </a:stretch>
+        </p:blipFill>
+        <p:spPr>
+          <a:xfrm>
+            <a:off x="7298966" y="1351582"/>
+            <a:ext cx="683414" cy="683414"/>
+          </a:xfrm>
+          <a:prstGeom prst="rect">
+            <a:avLst/>
+          </a:prstGeom>
+        </p:spPr>
+      </p:pic>
+      <p:pic>
+        <p:nvPicPr>
+          <p:cNvPr id="12" name="Graphic 11" descr="Quadcopter with solid fill">
+            <a:extLst>
+              <a:ext uri="{FF2B5EF4-FFF2-40B4-BE49-F238E27FC236}">
+                <a16:creationId xmlns:a16="http://schemas.microsoft.com/office/drawing/2014/main" id="{0C41AA66-22DF-8A47-896A-105A30E58DAB}"/>
+              </a:ext>
+            </a:extLst>
+          </p:cNvPr>
+          <p:cNvPicPr>
+            <a:picLocks noChangeAspect="1"/>
+          </p:cNvPicPr>
+          <p:nvPr/>
+        </p:nvPicPr>
+        <p:blipFill>
+          <a:blip r:embed="rId8">
+            <a:extLst>
+              <a:ext uri="{96DAC541-7B7A-43D3-8B79-37D633B846F1}">
+                <asvg:svgBlip xmlns:asvg="http://schemas.microsoft.com/office/drawing/2016/SVG/main" r:embed="rId9"/>
+              </a:ext>
+            </a:extLst>
+          </a:blip>
+          <a:stretch>
+            <a:fillRect/>
+          </a:stretch>
+        </p:blipFill>
+        <p:spPr>
+          <a:xfrm>
+            <a:off x="6419350" y="4330560"/>
+            <a:ext cx="914400" cy="914400"/>
+          </a:xfrm>
+          <a:prstGeom prst="rect">
+            <a:avLst/>
+          </a:prstGeom>
+        </p:spPr>
+      </p:pic>
+      <p:sp>
+        <p:nvSpPr>
+          <p:cNvPr id="13" name="TextBox 12">
+            <a:extLst>
+              <a:ext uri="{FF2B5EF4-FFF2-40B4-BE49-F238E27FC236}">
+                <a16:creationId xmlns:a16="http://schemas.microsoft.com/office/drawing/2014/main" id="{1ACEEAA5-69E2-FF46-ABE3-520370D00DEA}"/>
+              </a:ext>
+            </a:extLst>
+          </p:cNvPr>
+          <p:cNvSpPr txBox="1"/>
+          <p:nvPr/>
+        </p:nvSpPr>
+        <p:spPr>
+          <a:xfrm>
+            <a:off x="7271010" y="1995104"/>
+            <a:ext cx="1112226" cy="369332"/>
+          </a:xfrm>
+          <a:prstGeom prst="rect">
+            <a:avLst/>
+          </a:prstGeom>
+          <a:noFill/>
+        </p:spPr>
+        <p:txBody>
+          <a:bodyPr wrap="square" rtlCol="0">
+            <a:spAutoFit/>
+          </a:bodyPr>
+          <a:lstStyle/>
+          <a:p>
+            <a:r>
+              <a:rPr lang="en-US" dirty="0">
+                <a:latin typeface="Times" pitchFamily="2" charset="0"/>
+              </a:rPr>
+              <a:t>Target</a:t>
+            </a:r>
+          </a:p>
+        </p:txBody>
+      </p:sp>
+      <p:sp>
+        <p:nvSpPr>
+          <p:cNvPr id="15" name="Freeform 14">
+            <a:extLst>
+              <a:ext uri="{FF2B5EF4-FFF2-40B4-BE49-F238E27FC236}">
+                <a16:creationId xmlns:a16="http://schemas.microsoft.com/office/drawing/2014/main" id="{D3F6ABEF-680F-4D03-C7C1-9CA5EB3F14D8}"/>
+              </a:ext>
+            </a:extLst>
+          </p:cNvPr>
+          <p:cNvSpPr/>
+          <p:nvPr/>
+        </p:nvSpPr>
+        <p:spPr>
+          <a:xfrm>
+            <a:off x="6786009" y="3628248"/>
+            <a:ext cx="63199" cy="829452"/>
+          </a:xfrm>
+          <a:custGeom>
+            <a:avLst/>
+            <a:gdLst>
+              <a:gd name="connsiteX0" fmla="*/ 63199 w 63199"/>
+              <a:gd name="connsiteY0" fmla="*/ 829452 h 829452"/>
+              <a:gd name="connsiteX1" fmla="*/ 1653 w 63199"/>
+              <a:gd name="connsiteY1" fmla="*/ 433798 h 829452"/>
+              <a:gd name="connsiteX2" fmla="*/ 19237 w 63199"/>
+              <a:gd name="connsiteY2" fmla="*/ 90898 h 829452"/>
+              <a:gd name="connsiteX3" fmla="*/ 36822 w 63199"/>
+              <a:gd name="connsiteY3" fmla="*/ 11767 h 829452"/>
+            </a:gdLst>
+            <a:ahLst/>
+            <a:cxnLst>
+              <a:cxn ang="0">
+                <a:pos x="connsiteX0" y="connsiteY0"/>
+              </a:cxn>
+              <a:cxn ang="0">
+                <a:pos x="connsiteX1" y="connsiteY1"/>
+              </a:cxn>
+              <a:cxn ang="0">
+                <a:pos x="connsiteX2" y="connsiteY2"/>
+              </a:cxn>
+              <a:cxn ang="0">
+                <a:pos x="connsiteX3" y="connsiteY3"/>
+              </a:cxn>
+            </a:cxnLst>
+            <a:rect l="l" t="t" r="r" b="b"/>
+            <a:pathLst>
+              <a:path w="63199" h="829452">
+                <a:moveTo>
+                  <a:pt x="63199" y="829452"/>
+                </a:moveTo>
+                <a:cubicBezTo>
+                  <a:pt x="36089" y="693171"/>
+                  <a:pt x="8980" y="556890"/>
+                  <a:pt x="1653" y="433798"/>
+                </a:cubicBezTo>
+                <a:cubicBezTo>
+                  <a:pt x="-5674" y="310706"/>
+                  <a:pt x="13376" y="161236"/>
+                  <a:pt x="19237" y="90898"/>
+                </a:cubicBezTo>
+                <a:cubicBezTo>
+                  <a:pt x="25098" y="20560"/>
+                  <a:pt x="13376" y="-21937"/>
+                  <a:pt x="36822" y="11767"/>
+                </a:cubicBezTo>
+              </a:path>
+            </a:pathLst>
+          </a:custGeom>
+          <a:noFill/>
+        </p:spPr>
+        <p:style>
+          <a:lnRef idx="2">
+            <a:schemeClr val="accent1">
+              <a:shade val="50000"/>
+            </a:schemeClr>
+          </a:lnRef>
+          <a:fillRef idx="1">
+            <a:schemeClr val="accent1"/>
+          </a:fillRef>
+          <a:effectRef idx="0">
+            <a:schemeClr val="accent1"/>
+          </a:effectRef>
+          <a:fontRef idx="minor">
+            <a:schemeClr val="lt1"/>
+          </a:fontRef>
+        </p:style>
+        <p:txBody>
+          <a:bodyPr rtlCol="0" anchor="ctr"/>
+          <a:lstStyle/>
+          <a:p>
+            <a:pPr algn="ctr"/>
+            <a:endParaRPr lang="en-US"/>
+          </a:p>
+        </p:txBody>
+      </p:sp>
+      <p:pic>
+        <p:nvPicPr>
+          <p:cNvPr id="14" name="Graphic 13" descr="Quadcopter with solid fill">
+            <a:extLst>
+              <a:ext uri="{FF2B5EF4-FFF2-40B4-BE49-F238E27FC236}">
+                <a16:creationId xmlns:a16="http://schemas.microsoft.com/office/drawing/2014/main" id="{626B3D4B-E27E-ADB3-C758-778FED72DE1F}"/>
+              </a:ext>
+            </a:extLst>
+          </p:cNvPr>
+          <p:cNvPicPr>
+            <a:picLocks noChangeAspect="1"/>
+          </p:cNvPicPr>
+          <p:nvPr/>
+        </p:nvPicPr>
+        <p:blipFill>
+          <a:blip r:embed="rId8">
+            <a:extLst>
+              <a:ext uri="{96DAC541-7B7A-43D3-8B79-37D633B846F1}">
+                <asvg:svgBlip xmlns:asvg="http://schemas.microsoft.com/office/drawing/2016/SVG/main" r:embed="rId9"/>
+              </a:ext>
+            </a:extLst>
+          </a:blip>
+          <a:stretch>
+            <a:fillRect/>
+          </a:stretch>
+        </p:blipFill>
+        <p:spPr>
+          <a:xfrm rot="8979920">
+            <a:off x="6418116" y="3096068"/>
+            <a:ext cx="914400" cy="914400"/>
+          </a:xfrm>
+          <a:prstGeom prst="rect">
+            <a:avLst/>
+          </a:prstGeom>
+        </p:spPr>
+      </p:pic>
+    </p:spTree>
+    <p:extLst>
+      <p:ext uri="{BB962C8B-B14F-4D97-AF65-F5344CB8AC3E}">
+        <p14:creationId xmlns:p14="http://schemas.microsoft.com/office/powerpoint/2010/main" val="91092549"/>
+      </p:ext>
+    </p:extLst>
+  </p:cSld>
+  <p:clrMapOvr>
+    <a:masterClrMapping/>
+  </p:clrMapOvr>
+</p:sld>
+</file>
+
+<file path=ppt/slides/slide18.xml><?xml version="1.0" encoding="utf-8"?>
+<p:sld xmlns:a="http://schemas.openxmlformats.org/drawingml/2006/main" xmlns:r="http://schemas.openxmlformats.org/officeDocument/2006/relationships" xmlns:p="http://schemas.openxmlformats.org/presentationml/2006/main">
+  <p:cSld>
+    <p:spTree>
+      <p:nvGrpSpPr>
+        <p:cNvPr id="1" name=""/>
+        <p:cNvGrpSpPr/>
+        <p:nvPr/>
+      </p:nvGrpSpPr>
+      <p:grpSpPr>
+        <a:xfrm>
+          <a:off x="0" y="0"/>
+          <a:ext cx="0" cy="0"/>
+          <a:chOff x="0" y="0"/>
+          <a:chExt cx="0" cy="0"/>
+        </a:xfrm>
+      </p:grpSpPr>
+      <p:sp>
+        <p:nvSpPr>
+          <p:cNvPr id="2" name="Rectangle 1">
+            <a:extLst>
+              <a:ext uri="{FF2B5EF4-FFF2-40B4-BE49-F238E27FC236}">
+                <a16:creationId xmlns:a16="http://schemas.microsoft.com/office/drawing/2014/main" id="{5CF3775B-C1FD-F147-9996-7528BDA0F34E}"/>
+              </a:ext>
+            </a:extLst>
+          </p:cNvPr>
+          <p:cNvSpPr/>
+          <p:nvPr/>
+        </p:nvSpPr>
+        <p:spPr>
+          <a:xfrm>
+            <a:off x="2705100" y="1213338"/>
+            <a:ext cx="6781800" cy="4369777"/>
+          </a:xfrm>
+          <a:prstGeom prst="rect">
+            <a:avLst/>
+          </a:prstGeom>
+          <a:solidFill>
+            <a:schemeClr val="tx2">
+              <a:lumMod val="40000"/>
+              <a:lumOff val="60000"/>
+            </a:schemeClr>
+          </a:solidFill>
+          <a:ln>
+            <a:noFill/>
+          </a:ln>
+        </p:spPr>
+        <p:style>
+          <a:lnRef idx="2">
+            <a:schemeClr val="accent1">
+              <a:shade val="50000"/>
+            </a:schemeClr>
+          </a:lnRef>
+          <a:fillRef idx="1">
+            <a:schemeClr val="accent1"/>
+          </a:fillRef>
+          <a:effectRef idx="0">
+            <a:schemeClr val="accent1"/>
+          </a:effectRef>
+          <a:fontRef idx="minor">
+            <a:schemeClr val="lt1"/>
+          </a:fontRef>
+        </p:style>
+        <p:txBody>
+          <a:bodyPr rtlCol="0" anchor="ctr"/>
+          <a:lstStyle/>
+          <a:p>
+            <a:pPr algn="ctr"/>
+            <a:endParaRPr lang="en-US" dirty="0">
+              <a:latin typeface="Times" pitchFamily="2" charset="0"/>
+            </a:endParaRPr>
+          </a:p>
+        </p:txBody>
+      </p:sp>
+      <p:sp>
+        <p:nvSpPr>
+          <p:cNvPr id="3" name="Rectangle 2">
+            <a:extLst>
+              <a:ext uri="{FF2B5EF4-FFF2-40B4-BE49-F238E27FC236}">
+                <a16:creationId xmlns:a16="http://schemas.microsoft.com/office/drawing/2014/main" id="{70F637E1-41AA-0A44-A1AF-B9603B1AF2C5}"/>
+              </a:ext>
+            </a:extLst>
+          </p:cNvPr>
+          <p:cNvSpPr/>
+          <p:nvPr/>
+        </p:nvSpPr>
+        <p:spPr>
+          <a:xfrm rot="5400000">
+            <a:off x="6597161" y="1209345"/>
+            <a:ext cx="1515208" cy="4264269"/>
+          </a:xfrm>
+          <a:prstGeom prst="rect">
+            <a:avLst/>
+          </a:prstGeom>
+          <a:solidFill>
+            <a:schemeClr val="accent6">
+              <a:lumMod val="40000"/>
+              <a:lumOff val="60000"/>
+            </a:schemeClr>
+          </a:solidFill>
+          <a:ln>
+            <a:noFill/>
+          </a:ln>
+        </p:spPr>
+        <p:style>
+          <a:lnRef idx="2">
+            <a:schemeClr val="accent1">
+              <a:shade val="50000"/>
+            </a:schemeClr>
+          </a:lnRef>
+          <a:fillRef idx="1">
+            <a:schemeClr val="accent1"/>
+          </a:fillRef>
+          <a:effectRef idx="0">
+            <a:schemeClr val="accent1"/>
+          </a:effectRef>
+          <a:fontRef idx="minor">
+            <a:schemeClr val="lt1"/>
+          </a:fontRef>
+        </p:style>
+        <p:txBody>
+          <a:bodyPr rtlCol="0" anchor="ctr"/>
+          <a:lstStyle/>
+          <a:p>
+            <a:pPr algn="ctr"/>
+            <a:endParaRPr lang="en-US"/>
+          </a:p>
+        </p:txBody>
+      </p:sp>
+      <p:sp>
+        <p:nvSpPr>
+          <p:cNvPr id="6" name="TextBox 5">
+            <a:extLst>
+              <a:ext uri="{FF2B5EF4-FFF2-40B4-BE49-F238E27FC236}">
+                <a16:creationId xmlns:a16="http://schemas.microsoft.com/office/drawing/2014/main" id="{E9582660-A23C-BF4A-ABB6-4F9600478D81}"/>
+              </a:ext>
+            </a:extLst>
+          </p:cNvPr>
+          <p:cNvSpPr txBox="1"/>
+          <p:nvPr/>
+        </p:nvSpPr>
+        <p:spPr>
+          <a:xfrm>
+            <a:off x="7266661" y="3729752"/>
+            <a:ext cx="1112226" cy="369332"/>
+          </a:xfrm>
+          <a:prstGeom prst="rect">
+            <a:avLst/>
+          </a:prstGeom>
+          <a:noFill/>
+        </p:spPr>
+        <p:txBody>
+          <a:bodyPr wrap="square" rtlCol="0">
+            <a:spAutoFit/>
+          </a:bodyPr>
+          <a:lstStyle/>
+          <a:p>
+            <a:r>
+              <a:rPr lang="en-US" dirty="0">
+                <a:latin typeface="Times" pitchFamily="2" charset="0"/>
+              </a:rPr>
+              <a:t>Mode 2</a:t>
+            </a:r>
+          </a:p>
+        </p:txBody>
+      </p:sp>
+      <p:sp>
+        <p:nvSpPr>
+          <p:cNvPr id="7" name="TextBox 6">
+            <a:extLst>
+              <a:ext uri="{FF2B5EF4-FFF2-40B4-BE49-F238E27FC236}">
+                <a16:creationId xmlns:a16="http://schemas.microsoft.com/office/drawing/2014/main" id="{9812938F-9D59-FD44-80ED-6DEC72242200}"/>
+              </a:ext>
+            </a:extLst>
+          </p:cNvPr>
+          <p:cNvSpPr txBox="1"/>
+          <p:nvPr/>
+        </p:nvSpPr>
+        <p:spPr>
+          <a:xfrm>
+            <a:off x="8550095" y="5233397"/>
+            <a:ext cx="1112226" cy="369332"/>
+          </a:xfrm>
+          <a:prstGeom prst="rect">
+            <a:avLst/>
+          </a:prstGeom>
+          <a:noFill/>
+        </p:spPr>
+        <p:txBody>
+          <a:bodyPr wrap="square" rtlCol="0">
+            <a:spAutoFit/>
+          </a:bodyPr>
+          <a:lstStyle/>
+          <a:p>
+            <a:r>
+              <a:rPr lang="en-US" dirty="0">
+                <a:latin typeface="Times" pitchFamily="2" charset="0"/>
+              </a:rPr>
+              <a:t>Mode 1</a:t>
+            </a:r>
+          </a:p>
+        </p:txBody>
+      </p:sp>
+      <p:pic>
+        <p:nvPicPr>
+          <p:cNvPr id="16" name="Graphic 15" descr="Windy with solid fill">
+            <a:extLst>
+              <a:ext uri="{FF2B5EF4-FFF2-40B4-BE49-F238E27FC236}">
+                <a16:creationId xmlns:a16="http://schemas.microsoft.com/office/drawing/2014/main" id="{9FDE7563-0DBE-9F42-AF1E-DAAC88A4D545}"/>
+              </a:ext>
+            </a:extLst>
+          </p:cNvPr>
+          <p:cNvPicPr>
+            <a:picLocks noChangeAspect="1"/>
+          </p:cNvPicPr>
+          <p:nvPr/>
+        </p:nvPicPr>
+        <p:blipFill>
+          <a:blip r:embed="rId2">
+            <a:extLst>
+              <a:ext uri="{96DAC541-7B7A-43D3-8B79-37D633B846F1}">
+                <asvg:svgBlip xmlns:asvg="http://schemas.microsoft.com/office/drawing/2016/SVG/main" r:embed="rId3"/>
+              </a:ext>
+            </a:extLst>
+          </a:blip>
+          <a:stretch>
+            <a:fillRect/>
+          </a:stretch>
+        </p:blipFill>
+        <p:spPr>
+          <a:xfrm rot="10800000">
+            <a:off x="7597695" y="2835613"/>
+            <a:ext cx="914400" cy="914400"/>
+          </a:xfrm>
+          <a:prstGeom prst="rect">
+            <a:avLst/>
+          </a:prstGeom>
+        </p:spPr>
+      </p:pic>
+      <p:pic>
+        <p:nvPicPr>
+          <p:cNvPr id="18" name="Graphic 17" descr="Wind Turbines with solid fill">
+            <a:extLst>
+              <a:ext uri="{FF2B5EF4-FFF2-40B4-BE49-F238E27FC236}">
+                <a16:creationId xmlns:a16="http://schemas.microsoft.com/office/drawing/2014/main" id="{F11B0A6C-A3ED-B149-877E-1DF601CDCD8E}"/>
+              </a:ext>
+            </a:extLst>
+          </p:cNvPr>
+          <p:cNvPicPr>
+            <a:picLocks noChangeAspect="1"/>
+          </p:cNvPicPr>
+          <p:nvPr/>
+        </p:nvPicPr>
+        <p:blipFill>
+          <a:blip r:embed="rId4">
+            <a:extLst>
+              <a:ext uri="{96DAC541-7B7A-43D3-8B79-37D633B846F1}">
+                <asvg:svgBlip xmlns:asvg="http://schemas.microsoft.com/office/drawing/2016/SVG/main" r:embed="rId5"/>
+              </a:ext>
+            </a:extLst>
+          </a:blip>
+          <a:stretch>
+            <a:fillRect/>
+          </a:stretch>
+        </p:blipFill>
+        <p:spPr>
+          <a:xfrm>
+            <a:off x="8550095" y="2886780"/>
+            <a:ext cx="812066" cy="812066"/>
+          </a:xfrm>
+          <a:prstGeom prst="rect">
+            <a:avLst/>
+          </a:prstGeom>
+        </p:spPr>
+      </p:pic>
+      <p:sp>
+        <p:nvSpPr>
+          <p:cNvPr id="10" name="TextBox 9">
+            <a:extLst>
+              <a:ext uri="{FF2B5EF4-FFF2-40B4-BE49-F238E27FC236}">
+                <a16:creationId xmlns:a16="http://schemas.microsoft.com/office/drawing/2014/main" id="{F0D36253-EB82-614E-97A9-455D1272E3BB}"/>
+              </a:ext>
+            </a:extLst>
+          </p:cNvPr>
+          <p:cNvSpPr txBox="1"/>
+          <p:nvPr/>
+        </p:nvSpPr>
+        <p:spPr>
+          <a:xfrm>
+            <a:off x="6577821" y="5070753"/>
+            <a:ext cx="1019874" cy="369332"/>
+          </a:xfrm>
+          <a:prstGeom prst="rect">
+            <a:avLst/>
+          </a:prstGeom>
+          <a:noFill/>
+        </p:spPr>
+        <p:txBody>
+          <a:bodyPr wrap="square" rtlCol="0">
+            <a:spAutoFit/>
+          </a:bodyPr>
+          <a:lstStyle/>
+          <a:p>
+            <a:r>
+              <a:rPr lang="en-US" dirty="0">
+                <a:latin typeface="Times" pitchFamily="2" charset="0"/>
+              </a:rPr>
+              <a:t>Start</a:t>
+            </a:r>
+          </a:p>
+        </p:txBody>
+      </p:sp>
+      <p:pic>
+        <p:nvPicPr>
+          <p:cNvPr id="11" name="Graphic 10" descr="Star with solid fill">
+            <a:extLst>
+              <a:ext uri="{FF2B5EF4-FFF2-40B4-BE49-F238E27FC236}">
+                <a16:creationId xmlns:a16="http://schemas.microsoft.com/office/drawing/2014/main" id="{BA6FAECC-39D5-4C40-B668-CC67DDA3EA1E}"/>
+              </a:ext>
+            </a:extLst>
+          </p:cNvPr>
+          <p:cNvPicPr>
+            <a:picLocks noChangeAspect="1"/>
+          </p:cNvPicPr>
+          <p:nvPr/>
+        </p:nvPicPr>
+        <p:blipFill>
+          <a:blip r:embed="rId6">
+            <a:extLst>
+              <a:ext uri="{96DAC541-7B7A-43D3-8B79-37D633B846F1}">
+                <asvg:svgBlip xmlns:asvg="http://schemas.microsoft.com/office/drawing/2016/SVG/main" r:embed="rId7"/>
+              </a:ext>
+            </a:extLst>
+          </a:blip>
+          <a:stretch>
+            <a:fillRect/>
+          </a:stretch>
+        </p:blipFill>
+        <p:spPr>
+          <a:xfrm>
+            <a:off x="7298966" y="1351582"/>
+            <a:ext cx="683414" cy="683414"/>
+          </a:xfrm>
+          <a:prstGeom prst="rect">
+            <a:avLst/>
+          </a:prstGeom>
+        </p:spPr>
+      </p:pic>
+      <p:pic>
+        <p:nvPicPr>
+          <p:cNvPr id="12" name="Graphic 11" descr="Quadcopter with solid fill">
+            <a:extLst>
+              <a:ext uri="{FF2B5EF4-FFF2-40B4-BE49-F238E27FC236}">
+                <a16:creationId xmlns:a16="http://schemas.microsoft.com/office/drawing/2014/main" id="{0C41AA66-22DF-8A47-896A-105A30E58DAB}"/>
+              </a:ext>
+            </a:extLst>
+          </p:cNvPr>
+          <p:cNvPicPr>
+            <a:picLocks noChangeAspect="1"/>
+          </p:cNvPicPr>
+          <p:nvPr/>
+        </p:nvPicPr>
+        <p:blipFill>
+          <a:blip r:embed="rId8">
+            <a:extLst>
+              <a:ext uri="{96DAC541-7B7A-43D3-8B79-37D633B846F1}">
+                <asvg:svgBlip xmlns:asvg="http://schemas.microsoft.com/office/drawing/2016/SVG/main" r:embed="rId9"/>
+              </a:ext>
+            </a:extLst>
+          </a:blip>
+          <a:stretch>
+            <a:fillRect/>
+          </a:stretch>
+        </p:blipFill>
+        <p:spPr>
+          <a:xfrm>
+            <a:off x="6419350" y="4330560"/>
+            <a:ext cx="914400" cy="914400"/>
+          </a:xfrm>
+          <a:prstGeom prst="rect">
+            <a:avLst/>
+          </a:prstGeom>
+        </p:spPr>
+      </p:pic>
+      <p:sp>
+        <p:nvSpPr>
+          <p:cNvPr id="13" name="TextBox 12">
+            <a:extLst>
+              <a:ext uri="{FF2B5EF4-FFF2-40B4-BE49-F238E27FC236}">
+                <a16:creationId xmlns:a16="http://schemas.microsoft.com/office/drawing/2014/main" id="{1ACEEAA5-69E2-FF46-ABE3-520370D00DEA}"/>
+              </a:ext>
+            </a:extLst>
+          </p:cNvPr>
+          <p:cNvSpPr txBox="1"/>
+          <p:nvPr/>
+        </p:nvSpPr>
+        <p:spPr>
+          <a:xfrm>
+            <a:off x="7271010" y="1995104"/>
+            <a:ext cx="1112226" cy="369332"/>
+          </a:xfrm>
+          <a:prstGeom prst="rect">
+            <a:avLst/>
+          </a:prstGeom>
+          <a:noFill/>
+        </p:spPr>
+        <p:txBody>
+          <a:bodyPr wrap="square" rtlCol="0">
+            <a:spAutoFit/>
+          </a:bodyPr>
+          <a:lstStyle/>
+          <a:p>
+            <a:r>
+              <a:rPr lang="en-US" dirty="0">
+                <a:latin typeface="Times" pitchFamily="2" charset="0"/>
+              </a:rPr>
+              <a:t>Target</a:t>
+            </a:r>
+          </a:p>
+        </p:txBody>
+      </p:sp>
+      <p:sp>
+        <p:nvSpPr>
+          <p:cNvPr id="4" name="Freeform 3">
+            <a:extLst>
+              <a:ext uri="{FF2B5EF4-FFF2-40B4-BE49-F238E27FC236}">
+                <a16:creationId xmlns:a16="http://schemas.microsoft.com/office/drawing/2014/main" id="{E7DF2964-8896-6CAB-0E26-44E4E0BC29C2}"/>
+              </a:ext>
+            </a:extLst>
+          </p:cNvPr>
+          <p:cNvSpPr/>
+          <p:nvPr/>
+        </p:nvSpPr>
+        <p:spPr>
+          <a:xfrm>
+            <a:off x="4478120" y="1776046"/>
+            <a:ext cx="2986549" cy="2998177"/>
+          </a:xfrm>
+          <a:custGeom>
+            <a:avLst/>
+            <a:gdLst>
+              <a:gd name="connsiteX0" fmla="*/ 1966642 w 2986549"/>
+              <a:gd name="connsiteY0" fmla="*/ 2998177 h 2998177"/>
+              <a:gd name="connsiteX1" fmla="*/ 366442 w 2986549"/>
+              <a:gd name="connsiteY1" fmla="*/ 2734408 h 2998177"/>
+              <a:gd name="connsiteX2" fmla="*/ 5957 w 2986549"/>
+              <a:gd name="connsiteY2" fmla="*/ 1441939 h 2998177"/>
+              <a:gd name="connsiteX3" fmla="*/ 533495 w 2986549"/>
+              <a:gd name="connsiteY3" fmla="*/ 369277 h 2998177"/>
+              <a:gd name="connsiteX4" fmla="*/ 2986549 w 2986549"/>
+              <a:gd name="connsiteY4" fmla="*/ 0 h 2998177"/>
+              <a:gd name="connsiteX5" fmla="*/ 2986549 w 2986549"/>
+              <a:gd name="connsiteY5" fmla="*/ 0 h 2998177"/>
+            </a:gdLst>
+            <a:ahLst/>
+            <a:cxnLst>
+              <a:cxn ang="0">
+                <a:pos x="connsiteX0" y="connsiteY0"/>
+              </a:cxn>
+              <a:cxn ang="0">
+                <a:pos x="connsiteX1" y="connsiteY1"/>
+              </a:cxn>
+              <a:cxn ang="0">
+                <a:pos x="connsiteX2" y="connsiteY2"/>
+              </a:cxn>
+              <a:cxn ang="0">
+                <a:pos x="connsiteX3" y="connsiteY3"/>
+              </a:cxn>
+              <a:cxn ang="0">
+                <a:pos x="connsiteX4" y="connsiteY4"/>
+              </a:cxn>
+              <a:cxn ang="0">
+                <a:pos x="connsiteX5" y="connsiteY5"/>
+              </a:cxn>
+            </a:cxnLst>
+            <a:rect l="l" t="t" r="r" b="b"/>
+            <a:pathLst>
+              <a:path w="2986549" h="2998177">
+                <a:moveTo>
+                  <a:pt x="1966642" y="2998177"/>
+                </a:moveTo>
+                <a:cubicBezTo>
+                  <a:pt x="1329932" y="2995979"/>
+                  <a:pt x="693223" y="2993781"/>
+                  <a:pt x="366442" y="2734408"/>
+                </a:cubicBezTo>
+                <a:cubicBezTo>
+                  <a:pt x="39661" y="2475035"/>
+                  <a:pt x="-21885" y="1836127"/>
+                  <a:pt x="5957" y="1441939"/>
+                </a:cubicBezTo>
+                <a:cubicBezTo>
+                  <a:pt x="33799" y="1047750"/>
+                  <a:pt x="36730" y="609600"/>
+                  <a:pt x="533495" y="369277"/>
+                </a:cubicBezTo>
+                <a:cubicBezTo>
+                  <a:pt x="1030260" y="128954"/>
+                  <a:pt x="2986549" y="0"/>
+                  <a:pt x="2986549" y="0"/>
+                </a:cubicBezTo>
+                <a:lnTo>
+                  <a:pt x="2986549" y="0"/>
+                </a:lnTo>
+              </a:path>
+            </a:pathLst>
+          </a:custGeom>
+          <a:noFill/>
+        </p:spPr>
+        <p:style>
+          <a:lnRef idx="2">
+            <a:schemeClr val="accent1">
+              <a:shade val="50000"/>
+            </a:schemeClr>
+          </a:lnRef>
+          <a:fillRef idx="1">
+            <a:schemeClr val="accent1"/>
+          </a:fillRef>
+          <a:effectRef idx="0">
+            <a:schemeClr val="accent1"/>
+          </a:effectRef>
+          <a:fontRef idx="minor">
+            <a:schemeClr val="lt1"/>
+          </a:fontRef>
+        </p:style>
+        <p:txBody>
+          <a:bodyPr rtlCol="0" anchor="ctr"/>
+          <a:lstStyle/>
+          <a:p>
+            <a:pPr algn="ctr"/>
+            <a:endParaRPr lang="en-US"/>
+          </a:p>
+        </p:txBody>
+      </p:sp>
+    </p:spTree>
+    <p:extLst>
+      <p:ext uri="{BB962C8B-B14F-4D97-AF65-F5344CB8AC3E}">
+        <p14:creationId xmlns:p14="http://schemas.microsoft.com/office/powerpoint/2010/main" val="1509192902"/>
+      </p:ext>
+    </p:extLst>
+  </p:cSld>
+  <p:clrMapOvr>
+    <a:masterClrMapping/>
+  </p:clrMapOvr>
+</p:sld>
+</file>
+
 <file path=ppt/slides/slide2.xml><?xml version="1.0" encoding="utf-8"?>
 <p:sld xmlns:a="http://schemas.openxmlformats.org/drawingml/2006/main" xmlns:r="http://schemas.openxmlformats.org/officeDocument/2006/relationships" xmlns:p="http://schemas.openxmlformats.org/presentationml/2006/main">
   <p:cSld>

</xml_diff>